<commit_message>
Update Telco Integrator - Business Case.pptx
Added page 8 for Process Mining
</commit_message>
<xml_diff>
--- a/Business/Telco Integrator - Business Case.pptx
+++ b/Business/Telco Integrator - Business Case.pptx
@@ -12,6 +12,7 @@
     <p:sldId id="261" r:id="rId6"/>
     <p:sldId id="258" r:id="rId7"/>
     <p:sldId id="262" r:id="rId8"/>
+    <p:sldId id="263" r:id="rId9"/>
   </p:sldIdLst>
   <p:sldSz cx="12192000" cy="6858000"/>
   <p:notesSz cx="6858000" cy="9144000"/>
@@ -110,6 +111,11 @@
       </a:defRPr>
     </a:lvl9pPr>
   </p:defaultTextStyle>
+  <p:extLst>
+    <p:ext uri="{EFAFB233-063F-42B5-8137-9DF3F51BA10A}">
+      <p15:sldGuideLst xmlns:p15="http://schemas.microsoft.com/office/powerpoint/2012/main"/>
+    </p:ext>
+  </p:extLst>
 </p:presentation>
 </file>
 
@@ -582,7 +588,7 @@
           <a:p>
             <a:fld id="{EA0C0817-A112-4847-8014-A94B7D2A4EA3}" type="datetime1">
               <a:rPr lang="en-US" smtClean="0"/>
-              <a:t>2/8/21</a:t>
+              <a:t>5/6/21</a:t>
             </a:fld>
             <a:endParaRPr lang="en-US" dirty="0"/>
           </a:p>
@@ -784,7 +790,7 @@
           <a:p>
             <a:fld id="{134F40B7-36AB-4376-BE14-EF7004D79BB9}" type="datetime1">
               <a:rPr lang="en-US" smtClean="0"/>
-              <a:t>2/8/21</a:t>
+              <a:t>5/6/21</a:t>
             </a:fld>
             <a:endParaRPr lang="en-US"/>
           </a:p>
@@ -964,7 +970,7 @@
           <a:p>
             <a:fld id="{FF87CAB8-DCAE-46A5-AADA-B3FAD11A54E0}" type="datetime1">
               <a:rPr lang="en-US" smtClean="0"/>
-              <a:t>2/8/21</a:t>
+              <a:t>5/6/21</a:t>
             </a:fld>
             <a:endParaRPr lang="en-US"/>
           </a:p>
@@ -1134,7 +1140,7 @@
           <a:p>
             <a:fld id="{7332B432-ACDA-4023-A761-2BAB76577B62}" type="datetime1">
               <a:rPr lang="en-US" smtClean="0"/>
-              <a:t>2/8/21</a:t>
+              <a:t>5/6/21</a:t>
             </a:fld>
             <a:endParaRPr lang="en-US"/>
           </a:p>
@@ -1733,7 +1739,7 @@
           <a:p>
             <a:fld id="{D9C646AA-F36E-4540-911D-FFFC0A0EF24A}" type="datetime1">
               <a:rPr lang="en-US" smtClean="0"/>
-              <a:t>2/8/21</a:t>
+              <a:t>5/6/21</a:t>
             </a:fld>
             <a:endParaRPr lang="en-US" dirty="0"/>
           </a:p>
@@ -2053,7 +2059,7 @@
           <a:p>
             <a:fld id="{69186D26-FA5F-4637-B602-B7C2DC34CFD4}" type="datetime1">
               <a:rPr lang="en-US" smtClean="0"/>
-              <a:t>2/8/21</a:t>
+              <a:t>5/6/21</a:t>
             </a:fld>
             <a:endParaRPr lang="en-US"/>
           </a:p>
@@ -2488,7 +2494,7 @@
           <a:p>
             <a:fld id="{8A7F15D8-96D1-4781-BC50-CA8A088B2FE4}" type="datetime1">
               <a:rPr lang="en-US" smtClean="0"/>
-              <a:t>2/8/21</a:t>
+              <a:t>5/6/21</a:t>
             </a:fld>
             <a:endParaRPr lang="en-US"/>
           </a:p>
@@ -2606,7 +2612,7 @@
           <a:p>
             <a:fld id="{F9A96C99-B8F8-4528-BD05-0E16E943DC09}" type="datetime1">
               <a:rPr lang="en-US" smtClean="0"/>
-              <a:t>2/8/21</a:t>
+              <a:t>5/6/21</a:t>
             </a:fld>
             <a:endParaRPr lang="en-US"/>
           </a:p>
@@ -2701,7 +2707,7 @@
           <a:p>
             <a:fld id="{03636942-C211-4B28-8DBD-C953E00AF71B}" type="datetime1">
               <a:rPr lang="en-US" smtClean="0"/>
-              <a:t>2/8/21</a:t>
+              <a:t>5/6/21</a:t>
             </a:fld>
             <a:endParaRPr lang="en-US"/>
           </a:p>
@@ -3118,7 +3124,7 @@
           <a:p>
             <a:fld id="{7E8D12A6-918A-48BD-8CB9-CA713993B0EA}" type="datetime1">
               <a:rPr lang="en-US" smtClean="0"/>
-              <a:t>2/8/21</a:t>
+              <a:t>5/6/21</a:t>
             </a:fld>
             <a:endParaRPr lang="en-US"/>
           </a:p>
@@ -3380,7 +3386,7 @@
             <a:fld id="{E778CE86-875F-4587-BCF6-FA054AFC0D53}" type="datetime1">
               <a:rPr lang="en-US" smtClean="0"/>
               <a:pPr/>
-              <a:t>2/8/21</a:t>
+              <a:t>5/6/21</a:t>
             </a:fld>
             <a:endParaRPr lang="en-US" dirty="0"/>
           </a:p>
@@ -3896,7 +3902,7 @@
           <a:p>
             <a:fld id="{F6FA2B21-3FCD-4721-B95C-427943F61125}" type="datetime1">
               <a:rPr lang="en-US" smtClean="0"/>
-              <a:t>2/8/21</a:t>
+              <a:t>5/6/21</a:t>
             </a:fld>
             <a:endParaRPr lang="en-US"/>
           </a:p>
@@ -6870,14 +6876,14 @@
           <a:lstStyle/>
           <a:p>
             <a:r>
-              <a:rPr lang="en-US" sz="3200" b="1" dirty="0"/>
+              <a:rPr lang="en-US" sz="3200" b="1" u="sng" dirty="0"/>
               <a:t>The Telco Integrator reduces</a:t>
             </a:r>
             <a:r>
-              <a:rPr lang="en-US" sz="3200" dirty="0"/>
+              <a:rPr lang="en-US" sz="3200" u="sng" dirty="0"/>
               <a:t> integration cost, risk and time for the supply chain</a:t>
             </a:r>
-            <a:endParaRPr lang="en-US" sz="3200" b="1" dirty="0"/>
+            <a:endParaRPr lang="en-US" sz="3200" b="1" u="sng" dirty="0"/>
           </a:p>
         </p:txBody>
       </p:sp>
@@ -7482,6 +7488,507 @@
     <p:extLst>
       <p:ext uri="{BB962C8B-B14F-4D97-AF65-F5344CB8AC3E}">
         <p14:creationId xmlns:p14="http://schemas.microsoft.com/office/powerpoint/2010/main" val="1836474059"/>
+      </p:ext>
+    </p:extLst>
+  </p:cSld>
+  <p:clrMapOvr>
+    <a:masterClrMapping/>
+  </p:clrMapOvr>
+</p:sld>
+</file>
+
+<file path=ppt/slides/slide8.xml><?xml version="1.0" encoding="utf-8"?>
+<p:sld xmlns:a="http://schemas.openxmlformats.org/drawingml/2006/main" xmlns:r="http://schemas.openxmlformats.org/officeDocument/2006/relationships" xmlns:p="http://schemas.openxmlformats.org/presentationml/2006/main">
+  <p:cSld>
+    <p:bg>
+      <p:bgPr>
+        <a:solidFill>
+          <a:schemeClr val="bg1"/>
+        </a:solidFill>
+        <a:effectLst/>
+      </p:bgPr>
+    </p:bg>
+    <p:spTree>
+      <p:nvGrpSpPr>
+        <p:cNvPr id="1" name=""/>
+        <p:cNvGrpSpPr/>
+        <p:nvPr/>
+      </p:nvGrpSpPr>
+      <p:grpSpPr>
+        <a:xfrm>
+          <a:off x="0" y="0"/>
+          <a:ext cx="0" cy="0"/>
+          <a:chOff x="0" y="0"/>
+          <a:chExt cx="0" cy="0"/>
+        </a:xfrm>
+      </p:grpSpPr>
+      <p:sp>
+        <p:nvSpPr>
+          <p:cNvPr id="8" name="Rectangle 7">
+            <a:extLst>
+              <a:ext uri="{FF2B5EF4-FFF2-40B4-BE49-F238E27FC236}">
+                <a16:creationId xmlns:a16="http://schemas.microsoft.com/office/drawing/2014/main" id="{70120F84-A866-4D9F-8B1C-9120A013D654}"/>
+              </a:ext>
+              <a:ext uri="{C183D7F6-B498-43B3-948B-1728B52AA6E4}">
+                <adec:decorative xmlns:adec="http://schemas.microsoft.com/office/drawing/2017/decorative" val="1"/>
+              </a:ext>
+            </a:extLst>
+          </p:cNvPr>
+          <p:cNvSpPr>
+            <a:spLocks noGrp="1" noRot="1" noChangeAspect="1" noMove="1" noResize="1" noEditPoints="1" noAdjustHandles="1" noChangeArrowheads="1" noChangeShapeType="1" noTextEdit="1"/>
+          </p:cNvSpPr>
+          <p:nvPr>
+            <p:extLst>
+              <p:ext uri="{386F3935-93C4-4BCD-93E2-E3B085C9AB24}">
+                <p16:designElem xmlns:p16="http://schemas.microsoft.com/office/powerpoint/2015/main" val="1"/>
+              </p:ext>
+            </p:extLst>
+          </p:nvPr>
+        </p:nvSpPr>
+        <p:spPr>
+          <a:xfrm>
+            <a:off x="0" y="0"/>
+            <a:ext cx="12192001" cy="6858000"/>
+          </a:xfrm>
+          <a:prstGeom prst="rect">
+            <a:avLst/>
+          </a:prstGeom>
+          <a:solidFill>
+            <a:schemeClr val="tx1">
+              <a:lumMod val="65000"/>
+              <a:lumOff val="35000"/>
+            </a:schemeClr>
+          </a:solidFill>
+          <a:ln>
+            <a:noFill/>
+          </a:ln>
+        </p:spPr>
+        <p:style>
+          <a:lnRef idx="2">
+            <a:schemeClr val="accent1">
+              <a:shade val="50000"/>
+            </a:schemeClr>
+          </a:lnRef>
+          <a:fillRef idx="1">
+            <a:schemeClr val="accent1"/>
+          </a:fillRef>
+          <a:effectRef idx="0">
+            <a:schemeClr val="accent1"/>
+          </a:effectRef>
+          <a:fontRef idx="minor">
+            <a:schemeClr val="lt1"/>
+          </a:fontRef>
+        </p:style>
+        <p:txBody>
+          <a:bodyPr rot="0" spcFirstLastPara="0" vert="horz" wrap="square" lIns="91440" tIns="45720" rIns="91440" bIns="45720" numCol="1" spcCol="0" rtlCol="0" fromWordArt="0" anchor="ctr" anchorCtr="0" forceAA="0" compatLnSpc="1">
+            <a:prstTxWarp prst="textNoShape">
+              <a:avLst/>
+            </a:prstTxWarp>
+            <a:noAutofit/>
+          </a:bodyPr>
+          <a:lstStyle>
+            <a:defPPr>
+              <a:defRPr lang="en-US"/>
+            </a:defPPr>
+            <a:lvl1pPr marL="0" algn="l" defTabSz="914400" rtl="0" eaLnBrk="1" latinLnBrk="0" hangingPunct="1">
+              <a:defRPr sz="1800" kern="1200">
+                <a:solidFill>
+                  <a:schemeClr val="lt1"/>
+                </a:solidFill>
+                <a:latin typeface="+mn-lt"/>
+                <a:ea typeface="+mn-ea"/>
+                <a:cs typeface="+mn-cs"/>
+              </a:defRPr>
+            </a:lvl1pPr>
+            <a:lvl2pPr marL="457200" algn="l" defTabSz="914400" rtl="0" eaLnBrk="1" latinLnBrk="0" hangingPunct="1">
+              <a:defRPr sz="1800" kern="1200">
+                <a:solidFill>
+                  <a:schemeClr val="lt1"/>
+                </a:solidFill>
+                <a:latin typeface="+mn-lt"/>
+                <a:ea typeface="+mn-ea"/>
+                <a:cs typeface="+mn-cs"/>
+              </a:defRPr>
+            </a:lvl2pPr>
+            <a:lvl3pPr marL="914400" algn="l" defTabSz="914400" rtl="0" eaLnBrk="1" latinLnBrk="0" hangingPunct="1">
+              <a:defRPr sz="1800" kern="1200">
+                <a:solidFill>
+                  <a:schemeClr val="lt1"/>
+                </a:solidFill>
+                <a:latin typeface="+mn-lt"/>
+                <a:ea typeface="+mn-ea"/>
+                <a:cs typeface="+mn-cs"/>
+              </a:defRPr>
+            </a:lvl3pPr>
+            <a:lvl4pPr marL="1371600" algn="l" defTabSz="914400" rtl="0" eaLnBrk="1" latinLnBrk="0" hangingPunct="1">
+              <a:defRPr sz="1800" kern="1200">
+                <a:solidFill>
+                  <a:schemeClr val="lt1"/>
+                </a:solidFill>
+                <a:latin typeface="+mn-lt"/>
+                <a:ea typeface="+mn-ea"/>
+                <a:cs typeface="+mn-cs"/>
+              </a:defRPr>
+            </a:lvl4pPr>
+            <a:lvl5pPr marL="1828800" algn="l" defTabSz="914400" rtl="0" eaLnBrk="1" latinLnBrk="0" hangingPunct="1">
+              <a:defRPr sz="1800" kern="1200">
+                <a:solidFill>
+                  <a:schemeClr val="lt1"/>
+                </a:solidFill>
+                <a:latin typeface="+mn-lt"/>
+                <a:ea typeface="+mn-ea"/>
+                <a:cs typeface="+mn-cs"/>
+              </a:defRPr>
+            </a:lvl5pPr>
+            <a:lvl6pPr marL="2286000" algn="l" defTabSz="914400" rtl="0" eaLnBrk="1" latinLnBrk="0" hangingPunct="1">
+              <a:defRPr sz="1800" kern="1200">
+                <a:solidFill>
+                  <a:schemeClr val="lt1"/>
+                </a:solidFill>
+                <a:latin typeface="+mn-lt"/>
+                <a:ea typeface="+mn-ea"/>
+                <a:cs typeface="+mn-cs"/>
+              </a:defRPr>
+            </a:lvl6pPr>
+            <a:lvl7pPr marL="2743200" algn="l" defTabSz="914400" rtl="0" eaLnBrk="1" latinLnBrk="0" hangingPunct="1">
+              <a:defRPr sz="1800" kern="1200">
+                <a:solidFill>
+                  <a:schemeClr val="lt1"/>
+                </a:solidFill>
+                <a:latin typeface="+mn-lt"/>
+                <a:ea typeface="+mn-ea"/>
+                <a:cs typeface="+mn-cs"/>
+              </a:defRPr>
+            </a:lvl7pPr>
+            <a:lvl8pPr marL="3200400" algn="l" defTabSz="914400" rtl="0" eaLnBrk="1" latinLnBrk="0" hangingPunct="1">
+              <a:defRPr sz="1800" kern="1200">
+                <a:solidFill>
+                  <a:schemeClr val="lt1"/>
+                </a:solidFill>
+                <a:latin typeface="+mn-lt"/>
+                <a:ea typeface="+mn-ea"/>
+                <a:cs typeface="+mn-cs"/>
+              </a:defRPr>
+            </a:lvl8pPr>
+            <a:lvl9pPr marL="3657600" algn="l" defTabSz="914400" rtl="0" eaLnBrk="1" latinLnBrk="0" hangingPunct="1">
+              <a:defRPr sz="1800" kern="1200">
+                <a:solidFill>
+                  <a:schemeClr val="lt1"/>
+                </a:solidFill>
+                <a:latin typeface="+mn-lt"/>
+                <a:ea typeface="+mn-ea"/>
+                <a:cs typeface="+mn-cs"/>
+              </a:defRPr>
+            </a:lvl9pPr>
+          </a:lstStyle>
+          <a:p>
+            <a:pPr algn="ctr"/>
+            <a:endParaRPr lang="en-US"/>
+          </a:p>
+        </p:txBody>
+      </p:sp>
+      <p:sp useBgFill="1">
+        <p:nvSpPr>
+          <p:cNvPr id="10" name="Rectangle 9">
+            <a:extLst>
+              <a:ext uri="{FF2B5EF4-FFF2-40B4-BE49-F238E27FC236}">
+                <a16:creationId xmlns:a16="http://schemas.microsoft.com/office/drawing/2014/main" id="{252FEFEF-6AC0-46B6-AC09-11FC56196FA4}"/>
+              </a:ext>
+              <a:ext uri="{C183D7F6-B498-43B3-948B-1728B52AA6E4}">
+                <adec:decorative xmlns:adec="http://schemas.microsoft.com/office/drawing/2017/decorative" val="1"/>
+              </a:ext>
+            </a:extLst>
+          </p:cNvPr>
+          <p:cNvSpPr>
+            <a:spLocks noGrp="1" noRot="1" noChangeAspect="1" noMove="1" noResize="1" noEditPoints="1" noAdjustHandles="1" noChangeArrowheads="1" noChangeShapeType="1" noTextEdit="1"/>
+          </p:cNvSpPr>
+          <p:nvPr>
+            <p:extLst>
+              <p:ext uri="{386F3935-93C4-4BCD-93E2-E3B085C9AB24}">
+                <p16:designElem xmlns:p16="http://schemas.microsoft.com/office/powerpoint/2015/main" val="1"/>
+              </p:ext>
+            </p:extLst>
+          </p:nvPr>
+        </p:nvSpPr>
+        <p:spPr>
+          <a:xfrm>
+            <a:off x="210312" y="226665"/>
+            <a:ext cx="11722608" cy="6382512"/>
+          </a:xfrm>
+          <a:prstGeom prst="rect">
+            <a:avLst/>
+          </a:prstGeom>
+          <a:ln w="6350" cap="flat" cmpd="sng" algn="ctr">
+            <a:noFill/>
+            <a:prstDash val="solid"/>
+          </a:ln>
+          <a:effectLst>
+            <a:softEdge rad="0"/>
+          </a:effectLst>
+        </p:spPr>
+      </p:sp>
+      <p:sp>
+        <p:nvSpPr>
+          <p:cNvPr id="19" name="Rectangle 18">
+            <a:extLst>
+              <a:ext uri="{FF2B5EF4-FFF2-40B4-BE49-F238E27FC236}">
+                <a16:creationId xmlns:a16="http://schemas.microsoft.com/office/drawing/2014/main" id="{7213DC6C-753D-6644-867F-CF3B5A47F16E}"/>
+              </a:ext>
+            </a:extLst>
+          </p:cNvPr>
+          <p:cNvSpPr/>
+          <p:nvPr/>
+        </p:nvSpPr>
+        <p:spPr>
+          <a:xfrm>
+            <a:off x="5845589" y="1210300"/>
+            <a:ext cx="6087328" cy="3217612"/>
+          </a:xfrm>
+          <a:prstGeom prst="rect">
+            <a:avLst/>
+          </a:prstGeom>
+        </p:spPr>
+        <p:txBody>
+          <a:bodyPr wrap="square">
+            <a:spAutoFit/>
+          </a:bodyPr>
+          <a:lstStyle/>
+          <a:p>
+            <a:pPr lvl="1"/>
+            <a:endParaRPr lang="en-US" sz="1900" dirty="0">
+              <a:solidFill>
+                <a:srgbClr val="002060"/>
+              </a:solidFill>
+              <a:latin typeface="Avenir Medium" panose="02000503020000020003" pitchFamily="2" charset="0"/>
+            </a:endParaRPr>
+          </a:p>
+          <a:p>
+            <a:pPr lvl="1"/>
+            <a:r>
+              <a:rPr lang="en-US" sz="1900" dirty="0">
+                <a:solidFill>
+                  <a:srgbClr val="002060"/>
+                </a:solidFill>
+                <a:latin typeface="Avenir Medium" panose="02000503020000020003" pitchFamily="2" charset="0"/>
+              </a:rPr>
+              <a:t>The Telco Integrator leverages existing business processes, using Process Mining</a:t>
+            </a:r>
+          </a:p>
+          <a:p>
+            <a:pPr marL="1200150" lvl="2" indent="-285750">
+              <a:lnSpc>
+                <a:spcPct val="200000"/>
+              </a:lnSpc>
+              <a:buFont typeface="Arial" panose="020B0604020202020204" pitchFamily="34" charset="0"/>
+              <a:buChar char="•"/>
+            </a:pPr>
+            <a:r>
+              <a:rPr lang="en-US" sz="1900" b="1" dirty="0">
+                <a:solidFill>
+                  <a:srgbClr val="002060"/>
+                </a:solidFill>
+              </a:rPr>
+              <a:t>Provides telco pipelines as part of IBM OMS</a:t>
+            </a:r>
+          </a:p>
+          <a:p>
+            <a:pPr marL="1200150" lvl="2" indent="-285750">
+              <a:lnSpc>
+                <a:spcPct val="200000"/>
+              </a:lnSpc>
+              <a:buFont typeface="Arial" panose="020B0604020202020204" pitchFamily="34" charset="0"/>
+              <a:buChar char="•"/>
+            </a:pPr>
+            <a:r>
+              <a:rPr lang="en-US" sz="1900" b="1" dirty="0">
+                <a:solidFill>
+                  <a:srgbClr val="002060"/>
+                </a:solidFill>
+              </a:rPr>
+              <a:t>Accelerates the process modeling</a:t>
+            </a:r>
+          </a:p>
+          <a:p>
+            <a:pPr marL="1200150" lvl="2" indent="-285750">
+              <a:lnSpc>
+                <a:spcPct val="200000"/>
+              </a:lnSpc>
+              <a:buFont typeface="Arial" panose="020B0604020202020204" pitchFamily="34" charset="0"/>
+              <a:buChar char="•"/>
+            </a:pPr>
+            <a:r>
+              <a:rPr lang="en-US" sz="1900" b="1" dirty="0">
+                <a:solidFill>
+                  <a:srgbClr val="002060"/>
+                </a:solidFill>
+              </a:rPr>
+              <a:t>Industry-aligned pipelines can be tailored to fit specific customer needs</a:t>
+            </a:r>
+          </a:p>
+        </p:txBody>
+      </p:sp>
+      <p:sp>
+        <p:nvSpPr>
+          <p:cNvPr id="20" name="Title 1">
+            <a:extLst>
+              <a:ext uri="{FF2B5EF4-FFF2-40B4-BE49-F238E27FC236}">
+                <a16:creationId xmlns:a16="http://schemas.microsoft.com/office/drawing/2014/main" id="{3C69BE4E-42FD-6346-A092-86A0A2762E52}"/>
+              </a:ext>
+            </a:extLst>
+          </p:cNvPr>
+          <p:cNvSpPr>
+            <a:spLocks noGrp="1"/>
+          </p:cNvSpPr>
+          <p:nvPr>
+            <p:ph type="title"/>
+          </p:nvPr>
+        </p:nvSpPr>
+        <p:spPr>
+          <a:xfrm>
+            <a:off x="210312" y="247261"/>
+            <a:ext cx="11722608" cy="1003299"/>
+          </a:xfrm>
+        </p:spPr>
+        <p:txBody>
+          <a:bodyPr>
+            <a:normAutofit/>
+          </a:bodyPr>
+          <a:lstStyle/>
+          <a:p>
+            <a:r>
+              <a:rPr lang="en-US" sz="3200" b="1" u="sng" dirty="0"/>
+              <a:t>The Telco Integrator </a:t>
+            </a:r>
+            <a:r>
+              <a:rPr lang="en-US" sz="3200" u="sng" dirty="0"/>
+              <a:t>leverages existing business processes</a:t>
+            </a:r>
+            <a:endParaRPr lang="en-US" sz="3200" b="1" u="sng" dirty="0"/>
+          </a:p>
+        </p:txBody>
+      </p:sp>
+      <p:cxnSp>
+        <p:nvCxnSpPr>
+          <p:cNvPr id="22" name="Straight Connector 21">
+            <a:extLst>
+              <a:ext uri="{FF2B5EF4-FFF2-40B4-BE49-F238E27FC236}">
+                <a16:creationId xmlns:a16="http://schemas.microsoft.com/office/drawing/2014/main" id="{743D9423-5F3F-3B4D-BC50-759E472FE4FE}"/>
+              </a:ext>
+            </a:extLst>
+          </p:cNvPr>
+          <p:cNvCxnSpPr>
+            <a:cxnSpLocks/>
+          </p:cNvCxnSpPr>
+          <p:nvPr/>
+        </p:nvCxnSpPr>
+        <p:spPr>
+          <a:xfrm>
+            <a:off x="5845589" y="1556951"/>
+            <a:ext cx="0" cy="3107328"/>
+          </a:xfrm>
+          <a:prstGeom prst="line">
+            <a:avLst/>
+          </a:prstGeom>
+          <a:ln w="38100">
+            <a:solidFill>
+              <a:srgbClr val="002060"/>
+            </a:solidFill>
+          </a:ln>
+        </p:spPr>
+        <p:style>
+          <a:lnRef idx="1">
+            <a:schemeClr val="accent1"/>
+          </a:lnRef>
+          <a:fillRef idx="0">
+            <a:schemeClr val="accent1"/>
+          </a:fillRef>
+          <a:effectRef idx="0">
+            <a:schemeClr val="accent1"/>
+          </a:effectRef>
+          <a:fontRef idx="minor">
+            <a:schemeClr val="tx1"/>
+          </a:fontRef>
+        </p:style>
+      </p:cxnSp>
+      <p:sp>
+        <p:nvSpPr>
+          <p:cNvPr id="23" name="Rectangle 22">
+            <a:extLst>
+              <a:ext uri="{FF2B5EF4-FFF2-40B4-BE49-F238E27FC236}">
+                <a16:creationId xmlns:a16="http://schemas.microsoft.com/office/drawing/2014/main" id="{6CB54C1F-C83A-1A4C-9AD3-4EE3CD83DDAA}"/>
+              </a:ext>
+            </a:extLst>
+          </p:cNvPr>
+          <p:cNvSpPr/>
+          <p:nvPr/>
+        </p:nvSpPr>
+        <p:spPr>
+          <a:xfrm>
+            <a:off x="259080" y="1799739"/>
+            <a:ext cx="5721161" cy="2431435"/>
+          </a:xfrm>
+          <a:prstGeom prst="rect">
+            <a:avLst/>
+          </a:prstGeom>
+        </p:spPr>
+        <p:txBody>
+          <a:bodyPr wrap="square">
+            <a:spAutoFit/>
+          </a:bodyPr>
+          <a:lstStyle/>
+          <a:p>
+            <a:pPr lvl="1"/>
+            <a:endParaRPr lang="en-US" sz="1900" dirty="0">
+              <a:solidFill>
+                <a:srgbClr val="002060"/>
+              </a:solidFill>
+              <a:latin typeface="Avenir Medium" panose="02000503020000020003" pitchFamily="2" charset="0"/>
+            </a:endParaRPr>
+          </a:p>
+          <a:p>
+            <a:pPr lvl="1"/>
+            <a:r>
+              <a:rPr lang="en-US" sz="1900" dirty="0">
+                <a:solidFill>
+                  <a:srgbClr val="002060"/>
+                </a:solidFill>
+                <a:latin typeface="Avenir Medium" panose="02000503020000020003" pitchFamily="2" charset="0"/>
+              </a:rPr>
+              <a:t>In typical Telco engagements, the business processes that are involved in the organization are customer management, product management and order processing.</a:t>
+            </a:r>
+          </a:p>
+          <a:p>
+            <a:pPr lvl="1"/>
+            <a:endParaRPr lang="en-US" sz="1900" dirty="0">
+              <a:solidFill>
+                <a:srgbClr val="002060"/>
+              </a:solidFill>
+              <a:latin typeface="Avenir Medium" panose="02000503020000020003" pitchFamily="2" charset="0"/>
+            </a:endParaRPr>
+          </a:p>
+          <a:p>
+            <a:pPr lvl="1"/>
+            <a:r>
+              <a:rPr lang="en-US" sz="1900" dirty="0">
+                <a:solidFill>
+                  <a:srgbClr val="002060"/>
+                </a:solidFill>
+                <a:latin typeface="Avenir Medium" panose="02000503020000020003" pitchFamily="2" charset="0"/>
+              </a:rPr>
+              <a:t>CSPs should be able to leverage those processes in their integration solutions.</a:t>
+            </a:r>
+            <a:endParaRPr lang="en-US" sz="1900" dirty="0">
+              <a:solidFill>
+                <a:srgbClr val="002060"/>
+              </a:solidFill>
+            </a:endParaRPr>
+          </a:p>
+        </p:txBody>
+      </p:sp>
+    </p:spTree>
+    <p:extLst>
+      <p:ext uri="{BB962C8B-B14F-4D97-AF65-F5344CB8AC3E}">
+        <p14:creationId xmlns:p14="http://schemas.microsoft.com/office/powerpoint/2010/main" val="122242794"/>
       </p:ext>
     </p:extLst>
   </p:cSld>

</xml_diff>